<commit_message>
Cosine profile has phi offset instead of xoffset
</commit_message>
<xml_diff>
--- a/doc/Profiles/Profiles.pptx
+++ b/doc/Profiles/Profiles.pptx
@@ -8947,14 +8947,14 @@
           <a:p>
             <a:pPr algn="ctr"/>
             <a:r>
-              <a:rPr lang="fr-FR" sz="1400" dirty="0" err="1" smtClean="0">
+              <a:rPr lang="fr-FR" sz="1400" dirty="0" smtClean="0">
                 <a:solidFill>
                   <a:srgbClr val="0000FF"/>
                 </a:solidFill>
                 <a:latin typeface="Courier"/>
                 <a:cs typeface="Courier"/>
               </a:rPr>
-              <a:t>xoffset</a:t>
+              <a:t>≈ phi</a:t>
             </a:r>
             <a:endParaRPr lang="fr-FR" sz="1400" dirty="0">
               <a:solidFill>

</xml_diff>